<commit_message>
Edited model component class diagram and added sequence diagram for add, delete event features in developer guide.
</commit_message>
<xml_diff>
--- a/docs/diagrams/ModelComponentClassBetterOopDiagram.pptx
+++ b/docs/diagrams/ModelComponentClassBetterOopDiagram.pptx
@@ -208,7 +208,7 @@
           <a:p>
             <a:fld id="{F5CC4B3F-88C1-4FFA-B1B6-F41C21DC6924}" type="datetimeFigureOut">
               <a:rPr lang="en-US" smtClean="0"/>
-              <a:t>6/27/2018</a:t>
+              <a:t>10/17/2018</a:t>
             </a:fld>
             <a:endParaRPr lang="en-US"/>
           </a:p>
@@ -654,7 +654,7 @@
           <a:p>
             <a:fld id="{78C97017-6FC3-485B-9764-EAC9E56C1D49}" type="datetimeFigureOut">
               <a:rPr lang="en-US" smtClean="0"/>
-              <a:t>6/27/2018</a:t>
+              <a:t>10/17/2018</a:t>
             </a:fld>
             <a:endParaRPr lang="en-US"/>
           </a:p>
@@ -822,7 +822,7 @@
           <a:p>
             <a:fld id="{78C97017-6FC3-485B-9764-EAC9E56C1D49}" type="datetimeFigureOut">
               <a:rPr lang="en-US" smtClean="0"/>
-              <a:t>6/27/2018</a:t>
+              <a:t>10/17/2018</a:t>
             </a:fld>
             <a:endParaRPr lang="en-US"/>
           </a:p>
@@ -1000,7 +1000,7 @@
           <a:p>
             <a:fld id="{78C97017-6FC3-485B-9764-EAC9E56C1D49}" type="datetimeFigureOut">
               <a:rPr lang="en-US" smtClean="0"/>
-              <a:t>6/27/2018</a:t>
+              <a:t>10/17/2018</a:t>
             </a:fld>
             <a:endParaRPr lang="en-US"/>
           </a:p>
@@ -1168,7 +1168,7 @@
           <a:p>
             <a:fld id="{78C97017-6FC3-485B-9764-EAC9E56C1D49}" type="datetimeFigureOut">
               <a:rPr lang="en-US" smtClean="0"/>
-              <a:t>6/27/2018</a:t>
+              <a:t>10/17/2018</a:t>
             </a:fld>
             <a:endParaRPr lang="en-US"/>
           </a:p>
@@ -1413,7 +1413,7 @@
           <a:p>
             <a:fld id="{78C97017-6FC3-485B-9764-EAC9E56C1D49}" type="datetimeFigureOut">
               <a:rPr lang="en-US" smtClean="0"/>
-              <a:t>6/27/2018</a:t>
+              <a:t>10/17/2018</a:t>
             </a:fld>
             <a:endParaRPr lang="en-US"/>
           </a:p>
@@ -1698,7 +1698,7 @@
           <a:p>
             <a:fld id="{78C97017-6FC3-485B-9764-EAC9E56C1D49}" type="datetimeFigureOut">
               <a:rPr lang="en-US" smtClean="0"/>
-              <a:t>6/27/2018</a:t>
+              <a:t>10/17/2018</a:t>
             </a:fld>
             <a:endParaRPr lang="en-US"/>
           </a:p>
@@ -2117,7 +2117,7 @@
           <a:p>
             <a:fld id="{78C97017-6FC3-485B-9764-EAC9E56C1D49}" type="datetimeFigureOut">
               <a:rPr lang="en-US" smtClean="0"/>
-              <a:t>6/27/2018</a:t>
+              <a:t>10/17/2018</a:t>
             </a:fld>
             <a:endParaRPr lang="en-US"/>
           </a:p>
@@ -2234,7 +2234,7 @@
           <a:p>
             <a:fld id="{78C97017-6FC3-485B-9764-EAC9E56C1D49}" type="datetimeFigureOut">
               <a:rPr lang="en-US" smtClean="0"/>
-              <a:t>6/27/2018</a:t>
+              <a:t>10/17/2018</a:t>
             </a:fld>
             <a:endParaRPr lang="en-US"/>
           </a:p>
@@ -2329,7 +2329,7 @@
           <a:p>
             <a:fld id="{78C97017-6FC3-485B-9764-EAC9E56C1D49}" type="datetimeFigureOut">
               <a:rPr lang="en-US" smtClean="0"/>
-              <a:t>6/27/2018</a:t>
+              <a:t>10/17/2018</a:t>
             </a:fld>
             <a:endParaRPr lang="en-US"/>
           </a:p>
@@ -2604,7 +2604,7 @@
           <a:p>
             <a:fld id="{78C97017-6FC3-485B-9764-EAC9E56C1D49}" type="datetimeFigureOut">
               <a:rPr lang="en-US" smtClean="0"/>
-              <a:t>6/27/2018</a:t>
+              <a:t>10/17/2018</a:t>
             </a:fld>
             <a:endParaRPr lang="en-US"/>
           </a:p>
@@ -2856,7 +2856,7 @@
           <a:p>
             <a:fld id="{78C97017-6FC3-485B-9764-EAC9E56C1D49}" type="datetimeFigureOut">
               <a:rPr lang="en-US" smtClean="0"/>
-              <a:t>6/27/2018</a:t>
+              <a:t>10/17/2018</a:t>
             </a:fld>
             <a:endParaRPr lang="en-US"/>
           </a:p>
@@ -3067,7 +3067,7 @@
           <a:p>
             <a:fld id="{78C97017-6FC3-485B-9764-EAC9E56C1D49}" type="datetimeFigureOut">
               <a:rPr lang="en-US" smtClean="0"/>
-              <a:t>6/27/2018</a:t>
+              <a:t>10/17/2018</a:t>
             </a:fld>
             <a:endParaRPr lang="en-US"/>
           </a:p>
@@ -3450,8 +3450,8 @@
         </p:nvSpPr>
         <p:spPr>
           <a:xfrm>
-            <a:off x="1119865" y="1676400"/>
-            <a:ext cx="7490735" cy="3059747"/>
+            <a:off x="826632" y="1214756"/>
+            <a:ext cx="7490735" cy="4428487"/>
           </a:xfrm>
           <a:prstGeom prst="roundRect">
             <a:avLst>
@@ -3511,7 +3511,7 @@
         </p:nvSpPr>
         <p:spPr>
           <a:xfrm>
-            <a:off x="2877180" y="3463240"/>
+            <a:off x="2583947" y="4370336"/>
             <a:ext cx="1093635" cy="346760"/>
           </a:xfrm>
           <a:prstGeom prst="rect">
@@ -3570,7 +3570,7 @@
         </p:nvSpPr>
         <p:spPr>
           <a:xfrm rot="16200000">
-            <a:off x="1661548" y="3097750"/>
+            <a:off x="1368315" y="4004846"/>
             <a:ext cx="1093635" cy="346760"/>
           </a:xfrm>
           <a:prstGeom prst="rect">
@@ -3626,18 +3626,17 @@
           <p:cNvPr id="107" name="Elbow Connector 106"/>
           <p:cNvCxnSpPr>
             <a:cxnSpLocks/>
+            <a:endCxn id="62" idx="2"/>
           </p:cNvCxnSpPr>
           <p:nvPr/>
         </p:nvCxnSpPr>
         <p:spPr>
-          <a:xfrm rot="5400000" flipH="1" flipV="1">
-            <a:off x="4155901" y="1308943"/>
-            <a:ext cx="613122" cy="4459404"/>
-          </a:xfrm>
-          <a:prstGeom prst="bentConnector3">
-            <a:avLst>
-              <a:gd name="adj1" fmla="val -26668"/>
-            </a:avLst>
+          <a:xfrm flipV="1">
+            <a:off x="2095079" y="4111922"/>
+            <a:ext cx="4279458" cy="189934"/>
+          </a:xfrm>
+          <a:prstGeom prst="bentConnector2">
+            <a:avLst/>
           </a:prstGeom>
           <a:ln w="19050">
             <a:solidFill>
@@ -3672,7 +3671,7 @@
         </p:nvSpPr>
         <p:spPr>
           <a:xfrm rot="16200000">
-            <a:off x="956202" y="2861202"/>
+            <a:off x="662969" y="3768298"/>
             <a:ext cx="1093635" cy="346760"/>
           </a:xfrm>
           <a:prstGeom prst="rect">
@@ -3742,7 +3741,7 @@
         </p:nvSpPr>
         <p:spPr>
           <a:xfrm rot="16200000">
-            <a:off x="1626910" y="2952291"/>
+            <a:off x="1333677" y="3859387"/>
             <a:ext cx="270504" cy="175523"/>
           </a:xfrm>
           <a:prstGeom prst="triangle">
@@ -3792,7 +3791,7 @@
         </p:nvCxnSpPr>
         <p:spPr>
           <a:xfrm>
-            <a:off x="2609828" y="3636620"/>
+            <a:off x="2316595" y="4543716"/>
             <a:ext cx="267352" cy="0"/>
           </a:xfrm>
           <a:prstGeom prst="straightConnector1">
@@ -3830,7 +3829,7 @@
         </p:nvCxnSpPr>
         <p:spPr>
           <a:xfrm>
-            <a:off x="910091" y="3040053"/>
+            <a:off x="616858" y="3947149"/>
             <a:ext cx="419548" cy="2860"/>
           </a:xfrm>
           <a:prstGeom prst="bentConnector3">
@@ -3875,7 +3874,7 @@
         </p:nvCxnSpPr>
         <p:spPr>
           <a:xfrm flipV="1">
-            <a:off x="1849924" y="3040052"/>
+            <a:off x="1556691" y="3947148"/>
             <a:ext cx="216105" cy="1"/>
           </a:xfrm>
           <a:prstGeom prst="line">
@@ -3914,7 +3913,7 @@
         </p:nvSpPr>
         <p:spPr>
           <a:xfrm>
-            <a:off x="2373780" y="3549930"/>
+            <a:off x="2080547" y="4457026"/>
             <a:ext cx="236048" cy="173380"/>
           </a:xfrm>
           <a:prstGeom prst="flowChartDecision">
@@ -3959,7 +3958,7 @@
         </p:nvSpPr>
         <p:spPr>
           <a:xfrm>
-            <a:off x="2786406" y="2834911"/>
+            <a:off x="2493173" y="3742007"/>
             <a:ext cx="1447688" cy="346760"/>
           </a:xfrm>
           <a:prstGeom prst="rect">
@@ -3992,7 +3991,7 @@
           <a:p>
             <a:pPr algn="ctr"/>
             <a:r>
-              <a:rPr lang="en-US" sz="1050" dirty="0" err="1" smtClean="0">
+              <a:rPr lang="en-US" sz="1050" dirty="0" err="1">
                 <a:solidFill>
                   <a:srgbClr val="7030A0"/>
                 </a:solidFill>
@@ -4018,7 +4017,7 @@
         </p:nvCxnSpPr>
         <p:spPr>
           <a:xfrm>
-            <a:off x="2624360" y="3003033"/>
+            <a:off x="2331127" y="3910129"/>
             <a:ext cx="162046" cy="5258"/>
           </a:xfrm>
           <a:prstGeom prst="straightConnector1">
@@ -4056,7 +4055,7 @@
         </p:nvSpPr>
         <p:spPr>
           <a:xfrm>
-            <a:off x="2388312" y="2916343"/>
+            <a:off x="2095079" y="3823439"/>
             <a:ext cx="236048" cy="173380"/>
           </a:xfrm>
           <a:prstGeom prst="flowChartDecision">
@@ -4101,7 +4100,7 @@
         </p:nvSpPr>
         <p:spPr>
           <a:xfrm>
-            <a:off x="4762209" y="2863434"/>
+            <a:off x="4468976" y="3770530"/>
             <a:ext cx="1156969" cy="346760"/>
           </a:xfrm>
           <a:prstGeom prst="rect">
@@ -4157,7 +4156,7 @@
         </p:nvSpPr>
         <p:spPr>
           <a:xfrm>
-            <a:off x="4233246" y="2948201"/>
+            <a:off x="3940013" y="3855297"/>
             <a:ext cx="236048" cy="173380"/>
           </a:xfrm>
           <a:prstGeom prst="flowChartDecision">
@@ -4192,7 +4191,7 @@
           <a:lstStyle/>
           <a:p>
             <a:pPr algn="ctr"/>
-            <a:endParaRPr lang="en-US" sz="1050"/>
+            <a:endParaRPr lang="en-US" sz="1050" dirty="0"/>
           </a:p>
         </p:txBody>
       </p:sp>
@@ -4207,7 +4206,7 @@
         </p:nvCxnSpPr>
         <p:spPr>
           <a:xfrm>
-            <a:off x="4469294" y="3034891"/>
+            <a:off x="4176061" y="3941987"/>
             <a:ext cx="292915" cy="1923"/>
           </a:xfrm>
           <a:prstGeom prst="bentConnector3">
@@ -4245,7 +4244,7 @@
         </p:nvSpPr>
         <p:spPr>
           <a:xfrm>
-            <a:off x="6313677" y="2858066"/>
+            <a:off x="6020444" y="3765162"/>
             <a:ext cx="708186" cy="346760"/>
           </a:xfrm>
           <a:prstGeom prst="rect">
@@ -4301,7 +4300,7 @@
         </p:nvSpPr>
         <p:spPr>
           <a:xfrm>
-            <a:off x="5918460" y="2941065"/>
+            <a:off x="5625227" y="3848161"/>
             <a:ext cx="236048" cy="173380"/>
           </a:xfrm>
           <a:prstGeom prst="flowChartDecision">
@@ -4350,7 +4349,7 @@
         </p:nvCxnSpPr>
         <p:spPr>
           <a:xfrm>
-            <a:off x="6154508" y="3027755"/>
+            <a:off x="5861275" y="3934851"/>
             <a:ext cx="159169" cy="3691"/>
           </a:xfrm>
           <a:prstGeom prst="bentConnector3">
@@ -4388,7 +4387,7 @@
         </p:nvSpPr>
         <p:spPr>
           <a:xfrm>
-            <a:off x="7712397" y="2564238"/>
+            <a:off x="7419164" y="3471334"/>
             <a:ext cx="708186" cy="285783"/>
           </a:xfrm>
           <a:prstGeom prst="rect">
@@ -4444,7 +4443,7 @@
         </p:nvSpPr>
         <p:spPr>
           <a:xfrm>
-            <a:off x="7041947" y="2948201"/>
+            <a:off x="6748714" y="3855297"/>
             <a:ext cx="236048" cy="173380"/>
           </a:xfrm>
           <a:prstGeom prst="flowChartDecision">
@@ -4493,7 +4492,7 @@
         </p:nvCxnSpPr>
         <p:spPr>
           <a:xfrm flipV="1">
-            <a:off x="7277995" y="2706821"/>
+            <a:off x="6984762" y="3613917"/>
             <a:ext cx="434402" cy="327761"/>
           </a:xfrm>
           <a:prstGeom prst="bentConnector3">
@@ -4531,7 +4530,7 @@
         </p:nvSpPr>
         <p:spPr>
           <a:xfrm>
-            <a:off x="7712397" y="2887216"/>
+            <a:off x="7419164" y="3794312"/>
             <a:ext cx="708186" cy="285783"/>
           </a:xfrm>
           <a:prstGeom prst="rect">
@@ -4590,7 +4589,7 @@
         </p:nvCxnSpPr>
         <p:spPr>
           <a:xfrm flipV="1">
-            <a:off x="7277995" y="3030108"/>
+            <a:off x="6984762" y="3937204"/>
             <a:ext cx="434402" cy="4783"/>
           </a:xfrm>
           <a:prstGeom prst="bentConnector3">
@@ -4628,7 +4627,7 @@
         </p:nvSpPr>
         <p:spPr>
           <a:xfrm>
-            <a:off x="7712397" y="3210194"/>
+            <a:off x="7419164" y="4117290"/>
             <a:ext cx="708186" cy="285783"/>
           </a:xfrm>
           <a:prstGeom prst="rect">
@@ -4687,7 +4686,7 @@
         </p:nvCxnSpPr>
         <p:spPr>
           <a:xfrm>
-            <a:off x="7277995" y="3034891"/>
+            <a:off x="6984762" y="3941987"/>
             <a:ext cx="434402" cy="318195"/>
           </a:xfrm>
           <a:prstGeom prst="bentConnector3">
@@ -4725,7 +4724,7 @@
         </p:nvSpPr>
         <p:spPr>
           <a:xfrm>
-            <a:off x="7712397" y="3533171"/>
+            <a:off x="7419164" y="4440267"/>
             <a:ext cx="708186" cy="285783"/>
           </a:xfrm>
           <a:prstGeom prst="rect">
@@ -4784,7 +4783,7 @@
         </p:nvCxnSpPr>
         <p:spPr>
           <a:xfrm>
-            <a:off x="7277995" y="3034891"/>
+            <a:off x="6984762" y="3941987"/>
             <a:ext cx="434402" cy="641172"/>
           </a:xfrm>
           <a:prstGeom prst="bentConnector3">
@@ -4821,8 +4820,8 @@
           <p:nvPr/>
         </p:nvSpPr>
         <p:spPr>
-          <a:xfrm rot="16200000">
-            <a:off x="6362886" y="3586305"/>
+          <a:xfrm>
+            <a:off x="5333689" y="4298799"/>
             <a:ext cx="881018" cy="261610"/>
           </a:xfrm>
           <a:prstGeom prst="rect">
@@ -4861,7 +4860,7 @@
         </p:nvSpPr>
         <p:spPr>
           <a:xfrm>
-            <a:off x="2057401" y="4239491"/>
+            <a:off x="1764168" y="5146587"/>
             <a:ext cx="1066800" cy="346760"/>
           </a:xfrm>
           <a:prstGeom prst="rect">
@@ -4901,14 +4900,6 @@
               </a:rPr>
               <a:t>&lt;&lt;interface&gt;&gt;</a:t>
             </a:r>
-            <a:r>
-              <a:rPr lang="en-US" sz="1050">
-                <a:solidFill>
-                  <a:srgbClr val="7030A0"/>
-                </a:solidFill>
-              </a:rPr>
-              <a:t/>
-            </a:r>
             <a:br>
               <a:rPr lang="en-US" sz="1050">
                 <a:solidFill>
@@ -4943,7 +4934,7 @@
         </p:nvCxnSpPr>
         <p:spPr>
           <a:xfrm rot="16200000" flipH="1">
-            <a:off x="1364475" y="3719944"/>
+            <a:off x="1071242" y="4627040"/>
             <a:ext cx="831471" cy="554381"/>
           </a:xfrm>
           <a:prstGeom prst="bentConnector2">
@@ -4982,7 +4973,7 @@
         </p:nvSpPr>
         <p:spPr>
           <a:xfrm>
-            <a:off x="4324972" y="3058864"/>
+            <a:off x="4031739" y="3965960"/>
             <a:ext cx="189257" cy="178683"/>
           </a:xfrm>
           <a:prstGeom prst="rect">
@@ -5021,7 +5012,7 @@
         </p:nvSpPr>
         <p:spPr>
           <a:xfrm>
-            <a:off x="6135256" y="3097917"/>
+            <a:off x="5842023" y="4005013"/>
             <a:ext cx="189257" cy="178683"/>
           </a:xfrm>
           <a:prstGeom prst="rect">
@@ -5060,7 +5051,7 @@
         </p:nvSpPr>
         <p:spPr>
           <a:xfrm>
-            <a:off x="2560167" y="2753818"/>
+            <a:off x="2266934" y="3660914"/>
             <a:ext cx="78378" cy="193767"/>
           </a:xfrm>
           <a:prstGeom prst="rect">
@@ -5099,7 +5090,7 @@
         </p:nvSpPr>
         <p:spPr>
           <a:xfrm>
-            <a:off x="2707070" y="3667737"/>
+            <a:off x="2413837" y="4574833"/>
             <a:ext cx="189257" cy="178683"/>
           </a:xfrm>
           <a:prstGeom prst="rect">
@@ -5138,7 +5129,7 @@
         </p:nvSpPr>
         <p:spPr>
           <a:xfrm>
-            <a:off x="6449896" y="3204826"/>
+            <a:off x="6156663" y="4111922"/>
             <a:ext cx="189257" cy="178683"/>
           </a:xfrm>
           <a:prstGeom prst="rect">
@@ -5183,7 +5174,7 @@
         </p:nvSpPr>
         <p:spPr>
           <a:xfrm>
-            <a:off x="4755872" y="2206861"/>
+            <a:off x="4462639" y="3113957"/>
             <a:ext cx="1156969" cy="285783"/>
           </a:xfrm>
           <a:prstGeom prst="rect">
@@ -5249,7 +5240,7 @@
         </p:nvCxnSpPr>
         <p:spPr>
           <a:xfrm rot="5400000" flipH="1" flipV="1">
-            <a:off x="4233181" y="2536174"/>
+            <a:off x="3939948" y="3443270"/>
             <a:ext cx="709111" cy="336271"/>
           </a:xfrm>
           <a:prstGeom prst="bentConnector2">
@@ -5293,7 +5284,7 @@
         </p:nvSpPr>
         <p:spPr>
           <a:xfrm>
-            <a:off x="6714344" y="2430721"/>
+            <a:off x="6421111" y="3337817"/>
             <a:ext cx="189257" cy="178683"/>
           </a:xfrm>
           <a:prstGeom prst="rect">
@@ -5338,7 +5329,7 @@
         </p:nvSpPr>
         <p:spPr>
           <a:xfrm rot="16200000">
-            <a:off x="6553482" y="2664721"/>
+            <a:off x="6260249" y="3571817"/>
             <a:ext cx="236048" cy="173380"/>
           </a:xfrm>
           <a:prstGeom prst="flowChartDecision">
@@ -5392,7 +5383,7 @@
         </p:nvCxnSpPr>
         <p:spPr>
           <a:xfrm flipV="1">
-            <a:off x="5884280" y="2233006"/>
+            <a:off x="5591047" y="3140102"/>
             <a:ext cx="432916" cy="111294"/>
           </a:xfrm>
           <a:prstGeom prst="bentConnector3">
@@ -5436,7 +5427,7 @@
         </p:nvSpPr>
         <p:spPr>
           <a:xfrm>
-            <a:off x="6317196" y="2059626"/>
+            <a:off x="6023963" y="2966722"/>
             <a:ext cx="708186" cy="346760"/>
           </a:xfrm>
           <a:prstGeom prst="rect">
@@ -5498,7 +5489,7 @@
         </p:nvSpPr>
         <p:spPr>
           <a:xfrm>
-            <a:off x="6135256" y="2278014"/>
+            <a:off x="5842023" y="3185110"/>
             <a:ext cx="189257" cy="178683"/>
           </a:xfrm>
           <a:prstGeom prst="rect">
@@ -5543,7 +5534,7 @@
         </p:nvSpPr>
         <p:spPr>
           <a:xfrm>
-            <a:off x="4367100" y="2172972"/>
+            <a:off x="4073867" y="3080068"/>
             <a:ext cx="189257" cy="178683"/>
           </a:xfrm>
           <a:prstGeom prst="rect">
@@ -5588,7 +5579,7 @@
         </p:nvSpPr>
         <p:spPr>
           <a:xfrm>
-            <a:off x="5911329" y="2262081"/>
+            <a:off x="5618096" y="3169177"/>
             <a:ext cx="236048" cy="173380"/>
           </a:xfrm>
           <a:prstGeom prst="flowChartDecision">
@@ -5645,7 +5636,7 @@
         </p:nvCxnSpPr>
         <p:spPr>
           <a:xfrm rot="16200000" flipV="1">
-            <a:off x="6557898" y="2519778"/>
+            <a:off x="6264665" y="3426874"/>
             <a:ext cx="227001" cy="217"/>
           </a:xfrm>
           <a:prstGeom prst="bentConnector3">
@@ -5681,14 +5672,15 @@
         <p:nvCxnSpPr>
           <p:cNvPr id="90" name="Elbow Connector 63"/>
           <p:cNvCxnSpPr>
+            <a:cxnSpLocks/>
             <a:stCxn id="91" idx="3"/>
           </p:cNvCxnSpPr>
           <p:nvPr/>
         </p:nvCxnSpPr>
         <p:spPr>
           <a:xfrm rot="5400000">
-            <a:off x="3470636" y="2687353"/>
-            <a:ext cx="293825" cy="5938"/>
+            <a:off x="2361745" y="3049617"/>
+            <a:ext cx="1407407" cy="7597"/>
           </a:xfrm>
           <a:prstGeom prst="bentConnector3">
             <a:avLst>
@@ -5728,7 +5720,7 @@
         </p:nvSpPr>
         <p:spPr>
           <a:xfrm rot="10800000" flipV="1">
-            <a:off x="3479324" y="2386348"/>
+            <a:off x="2928053" y="2192650"/>
             <a:ext cx="282387" cy="157062"/>
           </a:xfrm>
           <a:prstGeom prst="triangle">
@@ -5776,7 +5768,7 @@
         </p:nvSpPr>
         <p:spPr>
           <a:xfrm>
-            <a:off x="1177947" y="1998144"/>
+            <a:off x="942912" y="1806982"/>
             <a:ext cx="1443661" cy="364396"/>
           </a:xfrm>
           <a:prstGeom prst="rect">
@@ -5847,7 +5839,7 @@
         </p:nvSpPr>
         <p:spPr>
           <a:xfrm>
-            <a:off x="3087206" y="1998144"/>
+            <a:off x="2954827" y="1811610"/>
             <a:ext cx="1060683" cy="364396"/>
           </a:xfrm>
           <a:prstGeom prst="rect">
@@ -5903,7 +5895,7 @@
         </p:nvSpPr>
         <p:spPr>
           <a:xfrm rot="16200000">
-            <a:off x="2586098" y="2068952"/>
+            <a:off x="2344775" y="1887546"/>
             <a:ext cx="271014" cy="187417"/>
           </a:xfrm>
           <a:prstGeom prst="triangle">
@@ -5951,15 +5943,16 @@
         <p:nvCxnSpPr>
           <p:cNvPr id="95" name="Elbow Connector 63"/>
           <p:cNvCxnSpPr>
+            <a:cxnSpLocks/>
             <a:stCxn id="94" idx="3"/>
             <a:endCxn id="93" idx="1"/>
           </p:cNvCxnSpPr>
           <p:nvPr/>
         </p:nvCxnSpPr>
         <p:spPr>
-          <a:xfrm>
-            <a:off x="2815314" y="2177521"/>
-            <a:ext cx="271892" cy="2821"/>
+          <a:xfrm flipV="1">
+            <a:off x="2573991" y="1993808"/>
+            <a:ext cx="380836" cy="2307"/>
           </a:xfrm>
           <a:prstGeom prst="bentConnector3">
             <a:avLst>
@@ -5991,6 +5984,519 @@
           </a:fontRef>
         </p:style>
       </p:cxnSp>
+      <p:sp>
+        <p:nvSpPr>
+          <p:cNvPr id="74" name="Flowchart: Decision 96">
+            <a:extLst>
+              <a:ext uri="{FF2B5EF4-FFF2-40B4-BE49-F238E27FC236}">
+                <a16:creationId xmlns:a16="http://schemas.microsoft.com/office/drawing/2014/main" id="{3CDEABB4-A137-4065-940C-6FAA44B02694}"/>
+              </a:ext>
+            </a:extLst>
+          </p:cNvPr>
+          <p:cNvSpPr/>
+          <p:nvPr/>
+        </p:nvSpPr>
+        <p:spPr>
+          <a:xfrm rot="5400000">
+            <a:off x="3550759" y="3514788"/>
+            <a:ext cx="236048" cy="173380"/>
+          </a:xfrm>
+          <a:prstGeom prst="flowChartDecision">
+            <a:avLst/>
+          </a:prstGeom>
+          <a:solidFill>
+            <a:srgbClr val="7030A0"/>
+          </a:solidFill>
+          <a:ln w="19050">
+            <a:solidFill>
+              <a:srgbClr val="7030A0"/>
+            </a:solidFill>
+          </a:ln>
+          <a:effectLst/>
+        </p:spPr>
+        <p:style>
+          <a:lnRef idx="1">
+            <a:schemeClr val="accent6"/>
+          </a:lnRef>
+          <a:fillRef idx="2">
+            <a:schemeClr val="accent6"/>
+          </a:fillRef>
+          <a:effectRef idx="1">
+            <a:schemeClr val="accent6"/>
+          </a:effectRef>
+          <a:fontRef idx="minor">
+            <a:schemeClr val="dk1"/>
+          </a:fontRef>
+        </p:style>
+        <p:txBody>
+          <a:bodyPr rtlCol="0" anchor="ctr"/>
+          <a:lstStyle/>
+          <a:p>
+            <a:pPr algn="ctr"/>
+            <a:endParaRPr lang="en-US" sz="1050"/>
+          </a:p>
+        </p:txBody>
+      </p:sp>
+      <p:cxnSp>
+        <p:nvCxnSpPr>
+          <p:cNvPr id="18" name="Connector: Elbow 17">
+            <a:extLst>
+              <a:ext uri="{FF2B5EF4-FFF2-40B4-BE49-F238E27FC236}">
+                <a16:creationId xmlns:a16="http://schemas.microsoft.com/office/drawing/2014/main" id="{0D56FAAE-274B-422B-878F-B71CBA1D5191}"/>
+              </a:ext>
+            </a:extLst>
+          </p:cNvPr>
+          <p:cNvCxnSpPr>
+            <a:cxnSpLocks/>
+            <a:endCxn id="87" idx="1"/>
+          </p:cNvCxnSpPr>
+          <p:nvPr/>
+        </p:nvCxnSpPr>
+        <p:spPr>
+          <a:xfrm rot="5400000" flipH="1" flipV="1">
+            <a:off x="3501717" y="2527424"/>
+            <a:ext cx="1124025" cy="789893"/>
+          </a:xfrm>
+          <a:prstGeom prst="bentConnector2">
+            <a:avLst/>
+          </a:prstGeom>
+          <a:ln w="19050" cap="flat" cmpd="sng" algn="ctr">
+            <a:solidFill>
+              <a:srgbClr val="7030A0"/>
+            </a:solidFill>
+            <a:prstDash val="solid"/>
+            <a:round/>
+            <a:headEnd type="none" w="med" len="med"/>
+            <a:tailEnd type="arrow" w="med" len="med"/>
+          </a:ln>
+        </p:spPr>
+        <p:style>
+          <a:lnRef idx="0">
+            <a:scrgbClr r="0" g="0" b="0"/>
+          </a:lnRef>
+          <a:fillRef idx="0">
+            <a:scrgbClr r="0" g="0" b="0"/>
+          </a:fillRef>
+          <a:effectRef idx="0">
+            <a:scrgbClr r="0" g="0" b="0"/>
+          </a:effectRef>
+          <a:fontRef idx="minor">
+            <a:schemeClr val="tx1"/>
+          </a:fontRef>
+        </p:style>
+      </p:cxnSp>
+      <p:sp>
+        <p:nvSpPr>
+          <p:cNvPr id="26" name="Rectangle 25">
+            <a:extLst>
+              <a:ext uri="{FF2B5EF4-FFF2-40B4-BE49-F238E27FC236}">
+                <a16:creationId xmlns:a16="http://schemas.microsoft.com/office/drawing/2014/main" id="{07429952-9656-481A-B7AE-C274A0B7F614}"/>
+              </a:ext>
+            </a:extLst>
+          </p:cNvPr>
+          <p:cNvSpPr/>
+          <p:nvPr/>
+        </p:nvSpPr>
+        <p:spPr>
+          <a:xfrm>
+            <a:off x="3420285" y="3226469"/>
+            <a:ext cx="301685" cy="261610"/>
+          </a:xfrm>
+          <a:prstGeom prst="rect">
+            <a:avLst/>
+          </a:prstGeom>
+        </p:spPr>
+        <p:txBody>
+          <a:bodyPr wrap="square">
+            <a:spAutoFit/>
+          </a:bodyPr>
+          <a:lstStyle/>
+          <a:p>
+            <a:pPr algn="ctr"/>
+            <a:r>
+              <a:rPr lang="en-US" sz="1100" dirty="0">
+                <a:solidFill>
+                  <a:srgbClr val="7030A0"/>
+                </a:solidFill>
+              </a:rPr>
+              <a:t>1</a:t>
+            </a:r>
+            <a:endParaRPr lang="en-SG" sz="1100" dirty="0">
+              <a:solidFill>
+                <a:srgbClr val="7030A0"/>
+              </a:solidFill>
+            </a:endParaRPr>
+          </a:p>
+        </p:txBody>
+      </p:sp>
+      <p:sp>
+        <p:nvSpPr>
+          <p:cNvPr id="87" name="Rectangle 8">
+            <a:extLst>
+              <a:ext uri="{FF2B5EF4-FFF2-40B4-BE49-F238E27FC236}">
+                <a16:creationId xmlns:a16="http://schemas.microsoft.com/office/drawing/2014/main" id="{111D8BF6-E93E-4023-B3C3-34CD61458118}"/>
+              </a:ext>
+            </a:extLst>
+          </p:cNvPr>
+          <p:cNvSpPr/>
+          <p:nvPr/>
+        </p:nvSpPr>
+        <p:spPr>
+          <a:xfrm>
+            <a:off x="4458676" y="2186977"/>
+            <a:ext cx="1156969" cy="346760"/>
+          </a:xfrm>
+          <a:prstGeom prst="rect">
+            <a:avLst/>
+          </a:prstGeom>
+          <a:ln w="19050">
+            <a:solidFill>
+              <a:srgbClr val="7030A0"/>
+            </a:solidFill>
+          </a:ln>
+          <a:effectLst/>
+        </p:spPr>
+        <p:style>
+          <a:lnRef idx="1">
+            <a:schemeClr val="accent4"/>
+          </a:lnRef>
+          <a:fillRef idx="2">
+            <a:schemeClr val="accent4"/>
+          </a:fillRef>
+          <a:effectRef idx="1">
+            <a:schemeClr val="accent4"/>
+          </a:effectRef>
+          <a:fontRef idx="minor">
+            <a:schemeClr val="dk1"/>
+          </a:fontRef>
+        </p:style>
+        <p:txBody>
+          <a:bodyPr rtlCol="0" anchor="ctr"/>
+          <a:lstStyle/>
+          <a:p>
+            <a:pPr algn="ctr"/>
+            <a:r>
+              <a:rPr lang="en-US" sz="1050" dirty="0">
+                <a:solidFill>
+                  <a:srgbClr val="7030A0"/>
+                </a:solidFill>
+              </a:rPr>
+              <a:t>Event</a:t>
+            </a:r>
+            <a:endParaRPr lang="en-SG" sz="1050" dirty="0">
+              <a:solidFill>
+                <a:srgbClr val="7030A0"/>
+              </a:solidFill>
+            </a:endParaRPr>
+          </a:p>
+        </p:txBody>
+      </p:sp>
+      <p:sp>
+        <p:nvSpPr>
+          <p:cNvPr id="96" name="Flowchart: Decision 96">
+            <a:extLst>
+              <a:ext uri="{FF2B5EF4-FFF2-40B4-BE49-F238E27FC236}">
+                <a16:creationId xmlns:a16="http://schemas.microsoft.com/office/drawing/2014/main" id="{E397AE17-2310-4AC3-8F48-445E30392EAC}"/>
+              </a:ext>
+            </a:extLst>
+          </p:cNvPr>
+          <p:cNvSpPr/>
+          <p:nvPr/>
+        </p:nvSpPr>
+        <p:spPr>
+          <a:xfrm>
+            <a:off x="5625227" y="2266355"/>
+            <a:ext cx="236048" cy="173380"/>
+          </a:xfrm>
+          <a:prstGeom prst="flowChartDecision">
+            <a:avLst/>
+          </a:prstGeom>
+          <a:solidFill>
+            <a:srgbClr val="7030A0"/>
+          </a:solidFill>
+          <a:ln w="19050">
+            <a:solidFill>
+              <a:srgbClr val="7030A0"/>
+            </a:solidFill>
+          </a:ln>
+          <a:effectLst/>
+        </p:spPr>
+        <p:style>
+          <a:lnRef idx="1">
+            <a:schemeClr val="accent6"/>
+          </a:lnRef>
+          <a:fillRef idx="2">
+            <a:schemeClr val="accent6"/>
+          </a:fillRef>
+          <a:effectRef idx="1">
+            <a:schemeClr val="accent6"/>
+          </a:effectRef>
+          <a:fontRef idx="minor">
+            <a:schemeClr val="dk1"/>
+          </a:fontRef>
+        </p:style>
+        <p:txBody>
+          <a:bodyPr rtlCol="0" anchor="ctr"/>
+          <a:lstStyle/>
+          <a:p>
+            <a:pPr algn="ctr"/>
+            <a:endParaRPr lang="en-US" sz="1050"/>
+          </a:p>
+        </p:txBody>
+      </p:sp>
+      <p:cxnSp>
+        <p:nvCxnSpPr>
+          <p:cNvPr id="100" name="Elbow Connector 78">
+            <a:extLst>
+              <a:ext uri="{FF2B5EF4-FFF2-40B4-BE49-F238E27FC236}">
+                <a16:creationId xmlns:a16="http://schemas.microsoft.com/office/drawing/2014/main" id="{C41A95D6-BC2E-44BD-A4BD-A04F7742C371}"/>
+              </a:ext>
+            </a:extLst>
+          </p:cNvPr>
+          <p:cNvCxnSpPr>
+            <a:cxnSpLocks/>
+          </p:cNvCxnSpPr>
+          <p:nvPr/>
+        </p:nvCxnSpPr>
+        <p:spPr>
+          <a:xfrm flipV="1">
+            <a:off x="5837819" y="2350027"/>
+            <a:ext cx="475332" cy="1"/>
+          </a:xfrm>
+          <a:prstGeom prst="bentConnector3">
+            <a:avLst/>
+          </a:prstGeom>
+          <a:ln w="19050">
+            <a:solidFill>
+              <a:srgbClr val="7030A0"/>
+            </a:solidFill>
+            <a:headEnd type="none" w="med" len="med"/>
+            <a:tailEnd type="arrow" w="med" len="med"/>
+          </a:ln>
+          <a:effectLst/>
+        </p:spPr>
+        <p:style>
+          <a:lnRef idx="1">
+            <a:schemeClr val="accent2"/>
+          </a:lnRef>
+          <a:fillRef idx="2">
+            <a:schemeClr val="accent2"/>
+          </a:fillRef>
+          <a:effectRef idx="1">
+            <a:schemeClr val="accent2"/>
+          </a:effectRef>
+          <a:fontRef idx="minor">
+            <a:schemeClr val="dk1"/>
+          </a:fontRef>
+        </p:style>
+      </p:cxnSp>
+      <p:sp>
+        <p:nvSpPr>
+          <p:cNvPr id="101" name="Rectangle 8">
+            <a:extLst>
+              <a:ext uri="{FF2B5EF4-FFF2-40B4-BE49-F238E27FC236}">
+                <a16:creationId xmlns:a16="http://schemas.microsoft.com/office/drawing/2014/main" id="{1126E5E1-5978-4AF6-AAB0-CEEF547568DF}"/>
+              </a:ext>
+            </a:extLst>
+          </p:cNvPr>
+          <p:cNvSpPr/>
+          <p:nvPr/>
+        </p:nvSpPr>
+        <p:spPr>
+          <a:xfrm>
+            <a:off x="6313151" y="2231326"/>
+            <a:ext cx="863386" cy="251279"/>
+          </a:xfrm>
+          <a:prstGeom prst="rect">
+            <a:avLst/>
+          </a:prstGeom>
+          <a:ln w="19050">
+            <a:solidFill>
+              <a:srgbClr val="7030A0"/>
+            </a:solidFill>
+          </a:ln>
+          <a:effectLst/>
+        </p:spPr>
+        <p:style>
+          <a:lnRef idx="1">
+            <a:schemeClr val="accent4"/>
+          </a:lnRef>
+          <a:fillRef idx="2">
+            <a:schemeClr val="accent4"/>
+          </a:fillRef>
+          <a:effectRef idx="1">
+            <a:schemeClr val="accent4"/>
+          </a:effectRef>
+          <a:fontRef idx="minor">
+            <a:schemeClr val="dk1"/>
+          </a:fontRef>
+        </p:style>
+        <p:txBody>
+          <a:bodyPr rtlCol="0" anchor="ctr"/>
+          <a:lstStyle/>
+          <a:p>
+            <a:pPr algn="ctr"/>
+            <a:r>
+              <a:rPr lang="en-US" sz="1050" dirty="0" err="1">
+                <a:solidFill>
+                  <a:srgbClr val="7030A0"/>
+                </a:solidFill>
+              </a:rPr>
+              <a:t>EventName</a:t>
+            </a:r>
+            <a:endParaRPr lang="en-SG" sz="1050" dirty="0">
+              <a:solidFill>
+                <a:srgbClr val="7030A0"/>
+              </a:solidFill>
+            </a:endParaRPr>
+          </a:p>
+        </p:txBody>
+      </p:sp>
+      <p:sp>
+        <p:nvSpPr>
+          <p:cNvPr id="108" name="Flowchart: Decision 96">
+            <a:extLst>
+              <a:ext uri="{FF2B5EF4-FFF2-40B4-BE49-F238E27FC236}">
+                <a16:creationId xmlns:a16="http://schemas.microsoft.com/office/drawing/2014/main" id="{12C8F670-1F59-4D4D-A627-C66919D504FD}"/>
+              </a:ext>
+            </a:extLst>
+          </p:cNvPr>
+          <p:cNvSpPr/>
+          <p:nvPr/>
+        </p:nvSpPr>
+        <p:spPr>
+          <a:xfrm rot="16200000">
+            <a:off x="5302355" y="2562150"/>
+            <a:ext cx="236048" cy="173380"/>
+          </a:xfrm>
+          <a:prstGeom prst="flowChartDecision">
+            <a:avLst/>
+          </a:prstGeom>
+          <a:noFill/>
+          <a:ln w="19050">
+            <a:solidFill>
+              <a:srgbClr val="7030A0"/>
+            </a:solidFill>
+          </a:ln>
+          <a:effectLst/>
+        </p:spPr>
+        <p:style>
+          <a:lnRef idx="1">
+            <a:schemeClr val="accent6"/>
+          </a:lnRef>
+          <a:fillRef idx="2">
+            <a:schemeClr val="accent6"/>
+          </a:fillRef>
+          <a:effectRef idx="1">
+            <a:schemeClr val="accent6"/>
+          </a:effectRef>
+          <a:fontRef idx="minor">
+            <a:schemeClr val="dk1"/>
+          </a:fontRef>
+        </p:style>
+        <p:txBody>
+          <a:bodyPr rtlCol="0" anchor="ctr"/>
+          <a:lstStyle/>
+          <a:p>
+            <a:pPr algn="ctr"/>
+            <a:endParaRPr lang="en-US" sz="1050"/>
+          </a:p>
+        </p:txBody>
+      </p:sp>
+      <p:cxnSp>
+        <p:nvCxnSpPr>
+          <p:cNvPr id="109" name="Elbow Connector 78">
+            <a:extLst>
+              <a:ext uri="{FF2B5EF4-FFF2-40B4-BE49-F238E27FC236}">
+                <a16:creationId xmlns:a16="http://schemas.microsoft.com/office/drawing/2014/main" id="{9B2C6340-1F75-4F01-BD2F-476EE868334E}"/>
+              </a:ext>
+            </a:extLst>
+          </p:cNvPr>
+          <p:cNvCxnSpPr>
+            <a:cxnSpLocks/>
+            <a:stCxn id="108" idx="1"/>
+            <a:endCxn id="67" idx="0"/>
+          </p:cNvCxnSpPr>
+          <p:nvPr/>
+        </p:nvCxnSpPr>
+        <p:spPr>
+          <a:xfrm rot="16200000" flipH="1">
+            <a:off x="5799288" y="2387954"/>
+            <a:ext cx="199858" cy="957677"/>
+          </a:xfrm>
+          <a:prstGeom prst="bentConnector3">
+            <a:avLst>
+              <a:gd name="adj1" fmla="val 39106"/>
+            </a:avLst>
+          </a:prstGeom>
+          <a:ln w="19050">
+            <a:solidFill>
+              <a:srgbClr val="7030A0"/>
+            </a:solidFill>
+            <a:headEnd type="none" w="med" len="med"/>
+            <a:tailEnd type="arrow" w="med" len="med"/>
+          </a:ln>
+          <a:effectLst/>
+        </p:spPr>
+        <p:style>
+          <a:lnRef idx="1">
+            <a:schemeClr val="accent2"/>
+          </a:lnRef>
+          <a:fillRef idx="2">
+            <a:schemeClr val="accent2"/>
+          </a:fillRef>
+          <a:effectRef idx="1">
+            <a:schemeClr val="accent2"/>
+          </a:effectRef>
+          <a:fontRef idx="minor">
+            <a:schemeClr val="dk1"/>
+          </a:fontRef>
+        </p:style>
+      </p:cxnSp>
+      <p:sp>
+        <p:nvSpPr>
+          <p:cNvPr id="113" name="Rectangle 112">
+            <a:extLst>
+              <a:ext uri="{FF2B5EF4-FFF2-40B4-BE49-F238E27FC236}">
+                <a16:creationId xmlns:a16="http://schemas.microsoft.com/office/drawing/2014/main" id="{F5330BDA-A89E-41BE-AD14-A6C351E98A1A}"/>
+              </a:ext>
+            </a:extLst>
+          </p:cNvPr>
+          <p:cNvSpPr/>
+          <p:nvPr/>
+        </p:nvSpPr>
+        <p:spPr>
+          <a:xfrm>
+            <a:off x="6163983" y="2677156"/>
+            <a:ext cx="255199" cy="261610"/>
+          </a:xfrm>
+          <a:prstGeom prst="rect">
+            <a:avLst/>
+          </a:prstGeom>
+        </p:spPr>
+        <p:txBody>
+          <a:bodyPr wrap="none">
+            <a:spAutoFit/>
+          </a:bodyPr>
+          <a:lstStyle/>
+          <a:p>
+            <a:pPr algn="ctr"/>
+            <a:r>
+              <a:rPr lang="en-US" sz="1100" dirty="0">
+                <a:solidFill>
+                  <a:srgbClr val="7030A0"/>
+                </a:solidFill>
+              </a:rPr>
+              <a:t>*</a:t>
+            </a:r>
+            <a:endParaRPr lang="en-SG" sz="1100" dirty="0">
+              <a:solidFill>
+                <a:srgbClr val="7030A0"/>
+              </a:solidFill>
+            </a:endParaRPr>
+          </a:p>
+        </p:txBody>
+      </p:sp>
     </p:spTree>
     <p:extLst>
       <p:ext uri="{BB962C8B-B14F-4D97-AF65-F5344CB8AC3E}">

</xml_diff>

<commit_message>
Edited parts of DG
</commit_message>
<xml_diff>
--- a/docs/diagrams/ModelComponentClassBetterOopDiagram.pptx
+++ b/docs/diagrams/ModelComponentClassBetterOopDiagram.pptx
@@ -208,7 +208,7 @@
           <a:p>
             <a:fld id="{F5CC4B3F-88C1-4FFA-B1B6-F41C21DC6924}" type="datetimeFigureOut">
               <a:rPr lang="en-US" smtClean="0"/>
-              <a:t>10/17/2018</a:t>
+              <a:t>11/6/2018</a:t>
             </a:fld>
             <a:endParaRPr lang="en-US"/>
           </a:p>
@@ -654,7 +654,7 @@
           <a:p>
             <a:fld id="{78C97017-6FC3-485B-9764-EAC9E56C1D49}" type="datetimeFigureOut">
               <a:rPr lang="en-US" smtClean="0"/>
-              <a:t>10/17/2018</a:t>
+              <a:t>11/6/2018</a:t>
             </a:fld>
             <a:endParaRPr lang="en-US"/>
           </a:p>
@@ -822,7 +822,7 @@
           <a:p>
             <a:fld id="{78C97017-6FC3-485B-9764-EAC9E56C1D49}" type="datetimeFigureOut">
               <a:rPr lang="en-US" smtClean="0"/>
-              <a:t>10/17/2018</a:t>
+              <a:t>11/6/2018</a:t>
             </a:fld>
             <a:endParaRPr lang="en-US"/>
           </a:p>
@@ -1000,7 +1000,7 @@
           <a:p>
             <a:fld id="{78C97017-6FC3-485B-9764-EAC9E56C1D49}" type="datetimeFigureOut">
               <a:rPr lang="en-US" smtClean="0"/>
-              <a:t>10/17/2018</a:t>
+              <a:t>11/6/2018</a:t>
             </a:fld>
             <a:endParaRPr lang="en-US"/>
           </a:p>
@@ -1168,7 +1168,7 @@
           <a:p>
             <a:fld id="{78C97017-6FC3-485B-9764-EAC9E56C1D49}" type="datetimeFigureOut">
               <a:rPr lang="en-US" smtClean="0"/>
-              <a:t>10/17/2018</a:t>
+              <a:t>11/6/2018</a:t>
             </a:fld>
             <a:endParaRPr lang="en-US"/>
           </a:p>
@@ -1413,7 +1413,7 @@
           <a:p>
             <a:fld id="{78C97017-6FC3-485B-9764-EAC9E56C1D49}" type="datetimeFigureOut">
               <a:rPr lang="en-US" smtClean="0"/>
-              <a:t>10/17/2018</a:t>
+              <a:t>11/6/2018</a:t>
             </a:fld>
             <a:endParaRPr lang="en-US"/>
           </a:p>
@@ -1698,7 +1698,7 @@
           <a:p>
             <a:fld id="{78C97017-6FC3-485B-9764-EAC9E56C1D49}" type="datetimeFigureOut">
               <a:rPr lang="en-US" smtClean="0"/>
-              <a:t>10/17/2018</a:t>
+              <a:t>11/6/2018</a:t>
             </a:fld>
             <a:endParaRPr lang="en-US"/>
           </a:p>
@@ -2117,7 +2117,7 @@
           <a:p>
             <a:fld id="{78C97017-6FC3-485B-9764-EAC9E56C1D49}" type="datetimeFigureOut">
               <a:rPr lang="en-US" smtClean="0"/>
-              <a:t>10/17/2018</a:t>
+              <a:t>11/6/2018</a:t>
             </a:fld>
             <a:endParaRPr lang="en-US"/>
           </a:p>
@@ -2234,7 +2234,7 @@
           <a:p>
             <a:fld id="{78C97017-6FC3-485B-9764-EAC9E56C1D49}" type="datetimeFigureOut">
               <a:rPr lang="en-US" smtClean="0"/>
-              <a:t>10/17/2018</a:t>
+              <a:t>11/6/2018</a:t>
             </a:fld>
             <a:endParaRPr lang="en-US"/>
           </a:p>
@@ -2329,7 +2329,7 @@
           <a:p>
             <a:fld id="{78C97017-6FC3-485B-9764-EAC9E56C1D49}" type="datetimeFigureOut">
               <a:rPr lang="en-US" smtClean="0"/>
-              <a:t>10/17/2018</a:t>
+              <a:t>11/6/2018</a:t>
             </a:fld>
             <a:endParaRPr lang="en-US"/>
           </a:p>
@@ -2604,7 +2604,7 @@
           <a:p>
             <a:fld id="{78C97017-6FC3-485B-9764-EAC9E56C1D49}" type="datetimeFigureOut">
               <a:rPr lang="en-US" smtClean="0"/>
-              <a:t>10/17/2018</a:t>
+              <a:t>11/6/2018</a:t>
             </a:fld>
             <a:endParaRPr lang="en-US"/>
           </a:p>
@@ -2856,7 +2856,7 @@
           <a:p>
             <a:fld id="{78C97017-6FC3-485B-9764-EAC9E56C1D49}" type="datetimeFigureOut">
               <a:rPr lang="en-US" smtClean="0"/>
-              <a:t>10/17/2018</a:t>
+              <a:t>11/6/2018</a:t>
             </a:fld>
             <a:endParaRPr lang="en-US"/>
           </a:p>
@@ -3067,7 +3067,7 @@
           <a:p>
             <a:fld id="{78C97017-6FC3-485B-9764-EAC9E56C1D49}" type="datetimeFigureOut">
               <a:rPr lang="en-US" smtClean="0"/>
-              <a:t>10/17/2018</a:t>
+              <a:t>11/6/2018</a:t>
             </a:fld>
             <a:endParaRPr lang="en-US"/>
           </a:p>
@@ -3450,8 +3450,8 @@
         </p:nvSpPr>
         <p:spPr>
           <a:xfrm>
-            <a:off x="826632" y="1214756"/>
-            <a:ext cx="7490735" cy="4428487"/>
+            <a:off x="826632" y="770580"/>
+            <a:ext cx="7700510" cy="4872663"/>
           </a:xfrm>
           <a:prstGeom prst="roundRect">
             <a:avLst>
@@ -6048,7 +6048,6 @@
           </p:cNvPr>
           <p:cNvCxnSpPr>
             <a:cxnSpLocks/>
-            <a:endCxn id="87" idx="1"/>
           </p:cNvCxnSpPr>
           <p:nvPr/>
         </p:nvCxnSpPr>
@@ -6131,229 +6130,6 @@
       </p:sp>
       <p:sp>
         <p:nvSpPr>
-          <p:cNvPr id="87" name="Rectangle 8">
-            <a:extLst>
-              <a:ext uri="{FF2B5EF4-FFF2-40B4-BE49-F238E27FC236}">
-                <a16:creationId xmlns:a16="http://schemas.microsoft.com/office/drawing/2014/main" id="{111D8BF6-E93E-4023-B3C3-34CD61458118}"/>
-              </a:ext>
-            </a:extLst>
-          </p:cNvPr>
-          <p:cNvSpPr/>
-          <p:nvPr/>
-        </p:nvSpPr>
-        <p:spPr>
-          <a:xfrm>
-            <a:off x="4458676" y="2186977"/>
-            <a:ext cx="1156969" cy="346760"/>
-          </a:xfrm>
-          <a:prstGeom prst="rect">
-            <a:avLst/>
-          </a:prstGeom>
-          <a:ln w="19050">
-            <a:solidFill>
-              <a:srgbClr val="7030A0"/>
-            </a:solidFill>
-          </a:ln>
-          <a:effectLst/>
-        </p:spPr>
-        <p:style>
-          <a:lnRef idx="1">
-            <a:schemeClr val="accent4"/>
-          </a:lnRef>
-          <a:fillRef idx="2">
-            <a:schemeClr val="accent4"/>
-          </a:fillRef>
-          <a:effectRef idx="1">
-            <a:schemeClr val="accent4"/>
-          </a:effectRef>
-          <a:fontRef idx="minor">
-            <a:schemeClr val="dk1"/>
-          </a:fontRef>
-        </p:style>
-        <p:txBody>
-          <a:bodyPr rtlCol="0" anchor="ctr"/>
-          <a:lstStyle/>
-          <a:p>
-            <a:pPr algn="ctr"/>
-            <a:r>
-              <a:rPr lang="en-US" sz="1050" dirty="0">
-                <a:solidFill>
-                  <a:srgbClr val="7030A0"/>
-                </a:solidFill>
-              </a:rPr>
-              <a:t>Event</a:t>
-            </a:r>
-            <a:endParaRPr lang="en-SG" sz="1050" dirty="0">
-              <a:solidFill>
-                <a:srgbClr val="7030A0"/>
-              </a:solidFill>
-            </a:endParaRPr>
-          </a:p>
-        </p:txBody>
-      </p:sp>
-      <p:sp>
-        <p:nvSpPr>
-          <p:cNvPr id="96" name="Flowchart: Decision 96">
-            <a:extLst>
-              <a:ext uri="{FF2B5EF4-FFF2-40B4-BE49-F238E27FC236}">
-                <a16:creationId xmlns:a16="http://schemas.microsoft.com/office/drawing/2014/main" id="{E397AE17-2310-4AC3-8F48-445E30392EAC}"/>
-              </a:ext>
-            </a:extLst>
-          </p:cNvPr>
-          <p:cNvSpPr/>
-          <p:nvPr/>
-        </p:nvSpPr>
-        <p:spPr>
-          <a:xfrm>
-            <a:off x="5625227" y="2266355"/>
-            <a:ext cx="236048" cy="173380"/>
-          </a:xfrm>
-          <a:prstGeom prst="flowChartDecision">
-            <a:avLst/>
-          </a:prstGeom>
-          <a:solidFill>
-            <a:srgbClr val="7030A0"/>
-          </a:solidFill>
-          <a:ln w="19050">
-            <a:solidFill>
-              <a:srgbClr val="7030A0"/>
-            </a:solidFill>
-          </a:ln>
-          <a:effectLst/>
-        </p:spPr>
-        <p:style>
-          <a:lnRef idx="1">
-            <a:schemeClr val="accent6"/>
-          </a:lnRef>
-          <a:fillRef idx="2">
-            <a:schemeClr val="accent6"/>
-          </a:fillRef>
-          <a:effectRef idx="1">
-            <a:schemeClr val="accent6"/>
-          </a:effectRef>
-          <a:fontRef idx="minor">
-            <a:schemeClr val="dk1"/>
-          </a:fontRef>
-        </p:style>
-        <p:txBody>
-          <a:bodyPr rtlCol="0" anchor="ctr"/>
-          <a:lstStyle/>
-          <a:p>
-            <a:pPr algn="ctr"/>
-            <a:endParaRPr lang="en-US" sz="1050"/>
-          </a:p>
-        </p:txBody>
-      </p:sp>
-      <p:cxnSp>
-        <p:nvCxnSpPr>
-          <p:cNvPr id="100" name="Elbow Connector 78">
-            <a:extLst>
-              <a:ext uri="{FF2B5EF4-FFF2-40B4-BE49-F238E27FC236}">
-                <a16:creationId xmlns:a16="http://schemas.microsoft.com/office/drawing/2014/main" id="{C41A95D6-BC2E-44BD-A4BD-A04F7742C371}"/>
-              </a:ext>
-            </a:extLst>
-          </p:cNvPr>
-          <p:cNvCxnSpPr>
-            <a:cxnSpLocks/>
-          </p:cNvCxnSpPr>
-          <p:nvPr/>
-        </p:nvCxnSpPr>
-        <p:spPr>
-          <a:xfrm flipV="1">
-            <a:off x="5837819" y="2350027"/>
-            <a:ext cx="475332" cy="1"/>
-          </a:xfrm>
-          <a:prstGeom prst="bentConnector3">
-            <a:avLst/>
-          </a:prstGeom>
-          <a:ln w="19050">
-            <a:solidFill>
-              <a:srgbClr val="7030A0"/>
-            </a:solidFill>
-            <a:headEnd type="none" w="med" len="med"/>
-            <a:tailEnd type="arrow" w="med" len="med"/>
-          </a:ln>
-          <a:effectLst/>
-        </p:spPr>
-        <p:style>
-          <a:lnRef idx="1">
-            <a:schemeClr val="accent2"/>
-          </a:lnRef>
-          <a:fillRef idx="2">
-            <a:schemeClr val="accent2"/>
-          </a:fillRef>
-          <a:effectRef idx="1">
-            <a:schemeClr val="accent2"/>
-          </a:effectRef>
-          <a:fontRef idx="minor">
-            <a:schemeClr val="dk1"/>
-          </a:fontRef>
-        </p:style>
-      </p:cxnSp>
-      <p:sp>
-        <p:nvSpPr>
-          <p:cNvPr id="101" name="Rectangle 8">
-            <a:extLst>
-              <a:ext uri="{FF2B5EF4-FFF2-40B4-BE49-F238E27FC236}">
-                <a16:creationId xmlns:a16="http://schemas.microsoft.com/office/drawing/2014/main" id="{1126E5E1-5978-4AF6-AAB0-CEEF547568DF}"/>
-              </a:ext>
-            </a:extLst>
-          </p:cNvPr>
-          <p:cNvSpPr/>
-          <p:nvPr/>
-        </p:nvSpPr>
-        <p:spPr>
-          <a:xfrm>
-            <a:off x="6313151" y="2231326"/>
-            <a:ext cx="863386" cy="251279"/>
-          </a:xfrm>
-          <a:prstGeom prst="rect">
-            <a:avLst/>
-          </a:prstGeom>
-          <a:ln w="19050">
-            <a:solidFill>
-              <a:srgbClr val="7030A0"/>
-            </a:solidFill>
-          </a:ln>
-          <a:effectLst/>
-        </p:spPr>
-        <p:style>
-          <a:lnRef idx="1">
-            <a:schemeClr val="accent4"/>
-          </a:lnRef>
-          <a:fillRef idx="2">
-            <a:schemeClr val="accent4"/>
-          </a:fillRef>
-          <a:effectRef idx="1">
-            <a:schemeClr val="accent4"/>
-          </a:effectRef>
-          <a:fontRef idx="minor">
-            <a:schemeClr val="dk1"/>
-          </a:fontRef>
-        </p:style>
-        <p:txBody>
-          <a:bodyPr rtlCol="0" anchor="ctr"/>
-          <a:lstStyle/>
-          <a:p>
-            <a:pPr algn="ctr"/>
-            <a:r>
-              <a:rPr lang="en-US" sz="1050" dirty="0" err="1">
-                <a:solidFill>
-                  <a:srgbClr val="7030A0"/>
-                </a:solidFill>
-              </a:rPr>
-              <a:t>EventName</a:t>
-            </a:r>
-            <a:endParaRPr lang="en-SG" sz="1050" dirty="0">
-              <a:solidFill>
-                <a:srgbClr val="7030A0"/>
-              </a:solidFill>
-            </a:endParaRPr>
-          </a:p>
-        </p:txBody>
-      </p:sp>
-      <p:sp>
-        <p:nvSpPr>
           <p:cNvPr id="108" name="Flowchart: Decision 96">
             <a:extLst>
               <a:ext uri="{FF2B5EF4-FFF2-40B4-BE49-F238E27FC236}">
@@ -6365,8 +6141,8 @@
           <p:nvPr/>
         </p:nvSpPr>
         <p:spPr>
-          <a:xfrm rot="16200000">
-            <a:off x="5302355" y="2562150"/>
+          <a:xfrm rot="10800000">
+            <a:off x="5606450" y="2255763"/>
             <a:ext cx="236048" cy="173380"/>
           </a:xfrm>
           <a:prstGeom prst="flowChartDecision">
@@ -6420,14 +6196,12 @@
           <p:nvPr/>
         </p:nvCxnSpPr>
         <p:spPr>
-          <a:xfrm rot="16200000" flipH="1">
-            <a:off x="5799288" y="2387954"/>
-            <a:ext cx="199858" cy="957677"/>
-          </a:xfrm>
-          <a:prstGeom prst="bentConnector3">
-            <a:avLst>
-              <a:gd name="adj1" fmla="val 39106"/>
-            </a:avLst>
+          <a:xfrm>
+            <a:off x="5842498" y="2342453"/>
+            <a:ext cx="535558" cy="624269"/>
+          </a:xfrm>
+          <a:prstGeom prst="bentConnector2">
+            <a:avLst/>
           </a:prstGeom>
           <a:ln w="19050">
             <a:solidFill>
@@ -6497,6 +6271,569 @@
           </a:p>
         </p:txBody>
       </p:sp>
+      <p:sp>
+        <p:nvSpPr>
+          <p:cNvPr id="73" name="Rectangle 8">
+            <a:extLst>
+              <a:ext uri="{FF2B5EF4-FFF2-40B4-BE49-F238E27FC236}">
+                <a16:creationId xmlns:a16="http://schemas.microsoft.com/office/drawing/2014/main" id="{FA76BA5A-9159-4880-971E-97102124ECE8}"/>
+              </a:ext>
+            </a:extLst>
+          </p:cNvPr>
+          <p:cNvSpPr/>
+          <p:nvPr/>
+        </p:nvSpPr>
+        <p:spPr>
+          <a:xfrm>
+            <a:off x="4434078" y="2184597"/>
+            <a:ext cx="1156969" cy="346760"/>
+          </a:xfrm>
+          <a:prstGeom prst="rect">
+            <a:avLst/>
+          </a:prstGeom>
+          <a:ln w="19050">
+            <a:solidFill>
+              <a:srgbClr val="7030A0"/>
+            </a:solidFill>
+          </a:ln>
+          <a:effectLst/>
+        </p:spPr>
+        <p:style>
+          <a:lnRef idx="1">
+            <a:schemeClr val="accent4"/>
+          </a:lnRef>
+          <a:fillRef idx="2">
+            <a:schemeClr val="accent4"/>
+          </a:fillRef>
+          <a:effectRef idx="1">
+            <a:schemeClr val="accent4"/>
+          </a:effectRef>
+          <a:fontRef idx="minor">
+            <a:schemeClr val="dk1"/>
+          </a:fontRef>
+        </p:style>
+        <p:txBody>
+          <a:bodyPr rtlCol="0" anchor="ctr"/>
+          <a:lstStyle/>
+          <a:p>
+            <a:pPr algn="ctr"/>
+            <a:r>
+              <a:rPr lang="en-US" sz="1050" dirty="0">
+                <a:solidFill>
+                  <a:srgbClr val="7030A0"/>
+                </a:solidFill>
+              </a:rPr>
+              <a:t>Event</a:t>
+            </a:r>
+            <a:endParaRPr lang="en-SG" sz="1050" dirty="0">
+              <a:solidFill>
+                <a:srgbClr val="7030A0"/>
+              </a:solidFill>
+            </a:endParaRPr>
+          </a:p>
+        </p:txBody>
+      </p:sp>
+      <p:sp>
+        <p:nvSpPr>
+          <p:cNvPr id="77" name="Rectangle 8">
+            <a:extLst>
+              <a:ext uri="{FF2B5EF4-FFF2-40B4-BE49-F238E27FC236}">
+                <a16:creationId xmlns:a16="http://schemas.microsoft.com/office/drawing/2014/main" id="{0379E076-B08A-462E-B686-FC7B86B7B5C0}"/>
+              </a:ext>
+            </a:extLst>
+          </p:cNvPr>
+          <p:cNvSpPr/>
+          <p:nvPr/>
+        </p:nvSpPr>
+        <p:spPr>
+          <a:xfrm>
+            <a:off x="2830684" y="1001167"/>
+            <a:ext cx="863386" cy="251279"/>
+          </a:xfrm>
+          <a:prstGeom prst="rect">
+            <a:avLst/>
+          </a:prstGeom>
+          <a:ln w="19050">
+            <a:solidFill>
+              <a:srgbClr val="7030A0"/>
+            </a:solidFill>
+          </a:ln>
+          <a:effectLst/>
+        </p:spPr>
+        <p:style>
+          <a:lnRef idx="1">
+            <a:schemeClr val="accent4"/>
+          </a:lnRef>
+          <a:fillRef idx="2">
+            <a:schemeClr val="accent4"/>
+          </a:fillRef>
+          <a:effectRef idx="1">
+            <a:schemeClr val="accent4"/>
+          </a:effectRef>
+          <a:fontRef idx="minor">
+            <a:schemeClr val="dk1"/>
+          </a:fontRef>
+        </p:style>
+        <p:txBody>
+          <a:bodyPr rtlCol="0" anchor="ctr"/>
+          <a:lstStyle/>
+          <a:p>
+            <a:pPr algn="ctr"/>
+            <a:r>
+              <a:rPr lang="en-US" sz="1050" dirty="0" err="1">
+                <a:solidFill>
+                  <a:srgbClr val="7030A0"/>
+                </a:solidFill>
+              </a:rPr>
+              <a:t>EventName</a:t>
+            </a:r>
+            <a:endParaRPr lang="en-SG" sz="1050" dirty="0">
+              <a:solidFill>
+                <a:srgbClr val="7030A0"/>
+              </a:solidFill>
+            </a:endParaRPr>
+          </a:p>
+        </p:txBody>
+      </p:sp>
+      <p:sp>
+        <p:nvSpPr>
+          <p:cNvPr id="88" name="Flowchart: Decision 96">
+            <a:extLst>
+              <a:ext uri="{FF2B5EF4-FFF2-40B4-BE49-F238E27FC236}">
+                <a16:creationId xmlns:a16="http://schemas.microsoft.com/office/drawing/2014/main" id="{AE02B547-438F-4360-B95E-A898D4E0A353}"/>
+              </a:ext>
+            </a:extLst>
+          </p:cNvPr>
+          <p:cNvSpPr/>
+          <p:nvPr/>
+        </p:nvSpPr>
+        <p:spPr>
+          <a:xfrm rot="16200000">
+            <a:off x="4894538" y="1976637"/>
+            <a:ext cx="236048" cy="173380"/>
+          </a:xfrm>
+          <a:prstGeom prst="flowChartDecision">
+            <a:avLst/>
+          </a:prstGeom>
+          <a:solidFill>
+            <a:srgbClr val="7030A0"/>
+          </a:solidFill>
+          <a:ln w="19050">
+            <a:solidFill>
+              <a:srgbClr val="7030A0"/>
+            </a:solidFill>
+          </a:ln>
+          <a:effectLst/>
+        </p:spPr>
+        <p:style>
+          <a:lnRef idx="1">
+            <a:schemeClr val="accent6"/>
+          </a:lnRef>
+          <a:fillRef idx="2">
+            <a:schemeClr val="accent6"/>
+          </a:fillRef>
+          <a:effectRef idx="1">
+            <a:schemeClr val="accent6"/>
+          </a:effectRef>
+          <a:fontRef idx="minor">
+            <a:schemeClr val="dk1"/>
+          </a:fontRef>
+        </p:style>
+        <p:txBody>
+          <a:bodyPr rtlCol="0" anchor="ctr"/>
+          <a:lstStyle/>
+          <a:p>
+            <a:pPr algn="ctr"/>
+            <a:endParaRPr lang="en-US" sz="1050"/>
+          </a:p>
+        </p:txBody>
+      </p:sp>
+      <p:cxnSp>
+        <p:nvCxnSpPr>
+          <p:cNvPr id="89" name="Elbow Connector 78">
+            <a:extLst>
+              <a:ext uri="{FF2B5EF4-FFF2-40B4-BE49-F238E27FC236}">
+                <a16:creationId xmlns:a16="http://schemas.microsoft.com/office/drawing/2014/main" id="{0A5E57D9-D838-4B3A-A3E4-5737967F4A90}"/>
+              </a:ext>
+            </a:extLst>
+          </p:cNvPr>
+          <p:cNvCxnSpPr>
+            <a:cxnSpLocks/>
+            <a:stCxn id="88" idx="3"/>
+            <a:endCxn id="103" idx="2"/>
+          </p:cNvCxnSpPr>
+          <p:nvPr/>
+        </p:nvCxnSpPr>
+        <p:spPr>
+          <a:xfrm rot="5400000" flipH="1" flipV="1">
+            <a:off x="5567414" y="697595"/>
+            <a:ext cx="692857" cy="1802561"/>
+          </a:xfrm>
+          <a:prstGeom prst="bentConnector3">
+            <a:avLst>
+              <a:gd name="adj1" fmla="val 50000"/>
+            </a:avLst>
+          </a:prstGeom>
+          <a:ln w="19050">
+            <a:solidFill>
+              <a:srgbClr val="7030A0"/>
+            </a:solidFill>
+            <a:headEnd type="none" w="med" len="med"/>
+            <a:tailEnd type="arrow" w="med" len="med"/>
+          </a:ln>
+          <a:effectLst/>
+        </p:spPr>
+        <p:style>
+          <a:lnRef idx="1">
+            <a:schemeClr val="accent2"/>
+          </a:lnRef>
+          <a:fillRef idx="2">
+            <a:schemeClr val="accent2"/>
+          </a:fillRef>
+          <a:effectRef idx="1">
+            <a:schemeClr val="accent2"/>
+          </a:effectRef>
+          <a:fontRef idx="minor">
+            <a:schemeClr val="dk1"/>
+          </a:fontRef>
+        </p:style>
+      </p:cxnSp>
+      <p:sp>
+        <p:nvSpPr>
+          <p:cNvPr id="97" name="Rectangle 8">
+            <a:extLst>
+              <a:ext uri="{FF2B5EF4-FFF2-40B4-BE49-F238E27FC236}">
+                <a16:creationId xmlns:a16="http://schemas.microsoft.com/office/drawing/2014/main" id="{75AF9C5F-C156-49E0-A91D-FF3000CE443A}"/>
+              </a:ext>
+            </a:extLst>
+          </p:cNvPr>
+          <p:cNvSpPr/>
+          <p:nvPr/>
+        </p:nvSpPr>
+        <p:spPr>
+          <a:xfrm>
+            <a:off x="3961704" y="1013953"/>
+            <a:ext cx="863386" cy="251279"/>
+          </a:xfrm>
+          <a:prstGeom prst="rect">
+            <a:avLst/>
+          </a:prstGeom>
+          <a:ln w="19050">
+            <a:solidFill>
+              <a:srgbClr val="7030A0"/>
+            </a:solidFill>
+          </a:ln>
+          <a:effectLst/>
+        </p:spPr>
+        <p:style>
+          <a:lnRef idx="1">
+            <a:schemeClr val="accent4"/>
+          </a:lnRef>
+          <a:fillRef idx="2">
+            <a:schemeClr val="accent4"/>
+          </a:fillRef>
+          <a:effectRef idx="1">
+            <a:schemeClr val="accent4"/>
+          </a:effectRef>
+          <a:fontRef idx="minor">
+            <a:schemeClr val="dk1"/>
+          </a:fontRef>
+        </p:style>
+        <p:txBody>
+          <a:bodyPr rtlCol="0" anchor="ctr"/>
+          <a:lstStyle/>
+          <a:p>
+            <a:pPr algn="ctr"/>
+            <a:r>
+              <a:rPr lang="en-US" sz="1050" dirty="0" err="1">
+                <a:solidFill>
+                  <a:srgbClr val="7030A0"/>
+                </a:solidFill>
+              </a:rPr>
+              <a:t>EventDate</a:t>
+            </a:r>
+            <a:endParaRPr lang="en-SG" sz="1050" dirty="0">
+              <a:solidFill>
+                <a:srgbClr val="7030A0"/>
+              </a:solidFill>
+            </a:endParaRPr>
+          </a:p>
+        </p:txBody>
+      </p:sp>
+      <p:cxnSp>
+        <p:nvCxnSpPr>
+          <p:cNvPr id="98" name="Elbow Connector 78">
+            <a:extLst>
+              <a:ext uri="{FF2B5EF4-FFF2-40B4-BE49-F238E27FC236}">
+                <a16:creationId xmlns:a16="http://schemas.microsoft.com/office/drawing/2014/main" id="{8310F7D6-14FE-42F6-9567-58B072ABE8CB}"/>
+              </a:ext>
+            </a:extLst>
+          </p:cNvPr>
+          <p:cNvCxnSpPr>
+            <a:cxnSpLocks/>
+            <a:stCxn id="88" idx="3"/>
+            <a:endCxn id="99" idx="2"/>
+          </p:cNvCxnSpPr>
+          <p:nvPr/>
+        </p:nvCxnSpPr>
+        <p:spPr>
+          <a:xfrm rot="5400000" flipH="1" flipV="1">
+            <a:off x="4940613" y="1324396"/>
+            <a:ext cx="692857" cy="548958"/>
+          </a:xfrm>
+          <a:prstGeom prst="bentConnector3">
+            <a:avLst>
+              <a:gd name="adj1" fmla="val 50000"/>
+            </a:avLst>
+          </a:prstGeom>
+          <a:ln w="19050">
+            <a:solidFill>
+              <a:srgbClr val="7030A0"/>
+            </a:solidFill>
+            <a:headEnd type="none" w="med" len="med"/>
+            <a:tailEnd type="arrow" w="med" len="med"/>
+          </a:ln>
+          <a:effectLst/>
+        </p:spPr>
+        <p:style>
+          <a:lnRef idx="1">
+            <a:schemeClr val="accent2"/>
+          </a:lnRef>
+          <a:fillRef idx="2">
+            <a:schemeClr val="accent2"/>
+          </a:fillRef>
+          <a:effectRef idx="1">
+            <a:schemeClr val="accent2"/>
+          </a:effectRef>
+          <a:fontRef idx="minor">
+            <a:schemeClr val="dk1"/>
+          </a:fontRef>
+        </p:style>
+      </p:cxnSp>
+      <p:sp>
+        <p:nvSpPr>
+          <p:cNvPr id="99" name="Rectangle 8">
+            <a:extLst>
+              <a:ext uri="{FF2B5EF4-FFF2-40B4-BE49-F238E27FC236}">
+                <a16:creationId xmlns:a16="http://schemas.microsoft.com/office/drawing/2014/main" id="{DE23D11C-32FF-48CF-ABB7-33CD9029C23D}"/>
+              </a:ext>
+            </a:extLst>
+          </p:cNvPr>
+          <p:cNvSpPr/>
+          <p:nvPr/>
+        </p:nvSpPr>
+        <p:spPr>
+          <a:xfrm>
+            <a:off x="5129827" y="1001167"/>
+            <a:ext cx="863386" cy="251279"/>
+          </a:xfrm>
+          <a:prstGeom prst="rect">
+            <a:avLst/>
+          </a:prstGeom>
+          <a:ln w="19050">
+            <a:solidFill>
+              <a:srgbClr val="7030A0"/>
+            </a:solidFill>
+          </a:ln>
+          <a:effectLst/>
+        </p:spPr>
+        <p:style>
+          <a:lnRef idx="1">
+            <a:schemeClr val="accent4"/>
+          </a:lnRef>
+          <a:fillRef idx="2">
+            <a:schemeClr val="accent4"/>
+          </a:fillRef>
+          <a:effectRef idx="1">
+            <a:schemeClr val="accent4"/>
+          </a:effectRef>
+          <a:fontRef idx="minor">
+            <a:schemeClr val="dk1"/>
+          </a:fontRef>
+        </p:style>
+        <p:txBody>
+          <a:bodyPr rtlCol="0" anchor="ctr"/>
+          <a:lstStyle/>
+          <a:p>
+            <a:pPr algn="ctr"/>
+            <a:r>
+              <a:rPr lang="en-US" sz="1050" dirty="0" err="1">
+                <a:solidFill>
+                  <a:srgbClr val="7030A0"/>
+                </a:solidFill>
+              </a:rPr>
+              <a:t>EventVenue</a:t>
+            </a:r>
+            <a:endParaRPr lang="en-SG" sz="1050" dirty="0">
+              <a:solidFill>
+                <a:srgbClr val="7030A0"/>
+              </a:solidFill>
+            </a:endParaRPr>
+          </a:p>
+        </p:txBody>
+      </p:sp>
+      <p:cxnSp>
+        <p:nvCxnSpPr>
+          <p:cNvPr id="102" name="Elbow Connector 78">
+            <a:extLst>
+              <a:ext uri="{FF2B5EF4-FFF2-40B4-BE49-F238E27FC236}">
+                <a16:creationId xmlns:a16="http://schemas.microsoft.com/office/drawing/2014/main" id="{016DEEFC-E6D1-491D-B5A2-6E06959E77E2}"/>
+              </a:ext>
+            </a:extLst>
+          </p:cNvPr>
+          <p:cNvCxnSpPr>
+            <a:cxnSpLocks/>
+            <a:stCxn id="88" idx="3"/>
+            <a:endCxn id="77" idx="2"/>
+          </p:cNvCxnSpPr>
+          <p:nvPr/>
+        </p:nvCxnSpPr>
+        <p:spPr>
+          <a:xfrm rot="16200000" flipV="1">
+            <a:off x="3791042" y="723782"/>
+            <a:ext cx="692857" cy="1750185"/>
+          </a:xfrm>
+          <a:prstGeom prst="bentConnector3">
+            <a:avLst>
+              <a:gd name="adj1" fmla="val 50000"/>
+            </a:avLst>
+          </a:prstGeom>
+          <a:ln w="19050">
+            <a:solidFill>
+              <a:srgbClr val="7030A0"/>
+            </a:solidFill>
+            <a:headEnd type="none" w="med" len="med"/>
+            <a:tailEnd type="arrow" w="med" len="med"/>
+          </a:ln>
+          <a:effectLst/>
+        </p:spPr>
+        <p:style>
+          <a:lnRef idx="1">
+            <a:schemeClr val="accent2"/>
+          </a:lnRef>
+          <a:fillRef idx="2">
+            <a:schemeClr val="accent2"/>
+          </a:fillRef>
+          <a:effectRef idx="1">
+            <a:schemeClr val="accent2"/>
+          </a:effectRef>
+          <a:fontRef idx="minor">
+            <a:schemeClr val="dk1"/>
+          </a:fontRef>
+        </p:style>
+      </p:cxnSp>
+      <p:sp>
+        <p:nvSpPr>
+          <p:cNvPr id="103" name="Rectangle 8">
+            <a:extLst>
+              <a:ext uri="{FF2B5EF4-FFF2-40B4-BE49-F238E27FC236}">
+                <a16:creationId xmlns:a16="http://schemas.microsoft.com/office/drawing/2014/main" id="{24A4E40A-F0BD-4538-9EB9-B624FF305ED1}"/>
+              </a:ext>
+            </a:extLst>
+          </p:cNvPr>
+          <p:cNvSpPr/>
+          <p:nvPr/>
+        </p:nvSpPr>
+        <p:spPr>
+          <a:xfrm>
+            <a:off x="6258397" y="1001168"/>
+            <a:ext cx="1113452" cy="251278"/>
+          </a:xfrm>
+          <a:prstGeom prst="rect">
+            <a:avLst/>
+          </a:prstGeom>
+          <a:ln w="19050">
+            <a:solidFill>
+              <a:srgbClr val="7030A0"/>
+            </a:solidFill>
+          </a:ln>
+          <a:effectLst/>
+        </p:spPr>
+        <p:style>
+          <a:lnRef idx="1">
+            <a:schemeClr val="accent4"/>
+          </a:lnRef>
+          <a:fillRef idx="2">
+            <a:schemeClr val="accent4"/>
+          </a:fillRef>
+          <a:effectRef idx="1">
+            <a:schemeClr val="accent4"/>
+          </a:effectRef>
+          <a:fontRef idx="minor">
+            <a:schemeClr val="dk1"/>
+          </a:fontRef>
+        </p:style>
+        <p:txBody>
+          <a:bodyPr rtlCol="0" anchor="ctr"/>
+          <a:lstStyle/>
+          <a:p>
+            <a:pPr algn="ctr"/>
+            <a:r>
+              <a:rPr lang="en-US" sz="1050" dirty="0" err="1">
+                <a:solidFill>
+                  <a:srgbClr val="7030A0"/>
+                </a:solidFill>
+              </a:rPr>
+              <a:t>EventStartTime</a:t>
+            </a:r>
+            <a:endParaRPr lang="en-SG" sz="1050" dirty="0">
+              <a:solidFill>
+                <a:srgbClr val="7030A0"/>
+              </a:solidFill>
+            </a:endParaRPr>
+          </a:p>
+        </p:txBody>
+      </p:sp>
+      <p:cxnSp>
+        <p:nvCxnSpPr>
+          <p:cNvPr id="104" name="Elbow Connector 78">
+            <a:extLst>
+              <a:ext uri="{FF2B5EF4-FFF2-40B4-BE49-F238E27FC236}">
+                <a16:creationId xmlns:a16="http://schemas.microsoft.com/office/drawing/2014/main" id="{860151EA-719B-49B6-948A-F1EBF192F43F}"/>
+              </a:ext>
+            </a:extLst>
+          </p:cNvPr>
+          <p:cNvCxnSpPr>
+            <a:cxnSpLocks/>
+            <a:stCxn id="88" idx="3"/>
+            <a:endCxn id="97" idx="2"/>
+          </p:cNvCxnSpPr>
+          <p:nvPr/>
+        </p:nvCxnSpPr>
+        <p:spPr>
+          <a:xfrm rot="16200000" flipV="1">
+            <a:off x="4362945" y="1295685"/>
+            <a:ext cx="680071" cy="619165"/>
+          </a:xfrm>
+          <a:prstGeom prst="bentConnector3">
+            <a:avLst>
+              <a:gd name="adj1" fmla="val 50000"/>
+            </a:avLst>
+          </a:prstGeom>
+          <a:ln w="19050">
+            <a:solidFill>
+              <a:srgbClr val="7030A0"/>
+            </a:solidFill>
+            <a:headEnd type="none" w="med" len="med"/>
+            <a:tailEnd type="arrow" w="med" len="med"/>
+          </a:ln>
+          <a:effectLst/>
+        </p:spPr>
+        <p:style>
+          <a:lnRef idx="1">
+            <a:schemeClr val="accent2"/>
+          </a:lnRef>
+          <a:fillRef idx="2">
+            <a:schemeClr val="accent2"/>
+          </a:fillRef>
+          <a:effectRef idx="1">
+            <a:schemeClr val="accent2"/>
+          </a:effectRef>
+          <a:fontRef idx="minor">
+            <a:schemeClr val="dk1"/>
+          </a:fontRef>
+        </p:style>
+      </p:cxnSp>
     </p:spTree>
     <p:extLst>
       <p:ext uri="{BB962C8B-B14F-4D97-AF65-F5344CB8AC3E}">

</xml_diff>

<commit_message>
Updated the model diagram to include attendance, uid and payment in the person model
</commit_message>
<xml_diff>
--- a/docs/diagrams/ModelComponentClassBetterOopDiagram.pptx
+++ b/docs/diagrams/ModelComponentClassBetterOopDiagram.pptx
@@ -208,7 +208,7 @@
           <a:p>
             <a:fld id="{F5CC4B3F-88C1-4FFA-B1B6-F41C21DC6924}" type="datetimeFigureOut">
               <a:rPr lang="en-US" smtClean="0"/>
-              <a:t>11/6/2018</a:t>
+              <a:t>11/12/2018</a:t>
             </a:fld>
             <a:endParaRPr lang="en-US"/>
           </a:p>
@@ -654,7 +654,7 @@
           <a:p>
             <a:fld id="{78C97017-6FC3-485B-9764-EAC9E56C1D49}" type="datetimeFigureOut">
               <a:rPr lang="en-US" smtClean="0"/>
-              <a:t>11/6/2018</a:t>
+              <a:t>11/12/2018</a:t>
             </a:fld>
             <a:endParaRPr lang="en-US"/>
           </a:p>
@@ -822,7 +822,7 @@
           <a:p>
             <a:fld id="{78C97017-6FC3-485B-9764-EAC9E56C1D49}" type="datetimeFigureOut">
               <a:rPr lang="en-US" smtClean="0"/>
-              <a:t>11/6/2018</a:t>
+              <a:t>11/12/2018</a:t>
             </a:fld>
             <a:endParaRPr lang="en-US"/>
           </a:p>
@@ -1000,7 +1000,7 @@
           <a:p>
             <a:fld id="{78C97017-6FC3-485B-9764-EAC9E56C1D49}" type="datetimeFigureOut">
               <a:rPr lang="en-US" smtClean="0"/>
-              <a:t>11/6/2018</a:t>
+              <a:t>11/12/2018</a:t>
             </a:fld>
             <a:endParaRPr lang="en-US"/>
           </a:p>
@@ -1168,7 +1168,7 @@
           <a:p>
             <a:fld id="{78C97017-6FC3-485B-9764-EAC9E56C1D49}" type="datetimeFigureOut">
               <a:rPr lang="en-US" smtClean="0"/>
-              <a:t>11/6/2018</a:t>
+              <a:t>11/12/2018</a:t>
             </a:fld>
             <a:endParaRPr lang="en-US"/>
           </a:p>
@@ -1413,7 +1413,7 @@
           <a:p>
             <a:fld id="{78C97017-6FC3-485B-9764-EAC9E56C1D49}" type="datetimeFigureOut">
               <a:rPr lang="en-US" smtClean="0"/>
-              <a:t>11/6/2018</a:t>
+              <a:t>11/12/2018</a:t>
             </a:fld>
             <a:endParaRPr lang="en-US"/>
           </a:p>
@@ -1698,7 +1698,7 @@
           <a:p>
             <a:fld id="{78C97017-6FC3-485B-9764-EAC9E56C1D49}" type="datetimeFigureOut">
               <a:rPr lang="en-US" smtClean="0"/>
-              <a:t>11/6/2018</a:t>
+              <a:t>11/12/2018</a:t>
             </a:fld>
             <a:endParaRPr lang="en-US"/>
           </a:p>
@@ -2117,7 +2117,7 @@
           <a:p>
             <a:fld id="{78C97017-6FC3-485B-9764-EAC9E56C1D49}" type="datetimeFigureOut">
               <a:rPr lang="en-US" smtClean="0"/>
-              <a:t>11/6/2018</a:t>
+              <a:t>11/12/2018</a:t>
             </a:fld>
             <a:endParaRPr lang="en-US"/>
           </a:p>
@@ -2234,7 +2234,7 @@
           <a:p>
             <a:fld id="{78C97017-6FC3-485B-9764-EAC9E56C1D49}" type="datetimeFigureOut">
               <a:rPr lang="en-US" smtClean="0"/>
-              <a:t>11/6/2018</a:t>
+              <a:t>11/12/2018</a:t>
             </a:fld>
             <a:endParaRPr lang="en-US"/>
           </a:p>
@@ -2329,7 +2329,7 @@
           <a:p>
             <a:fld id="{78C97017-6FC3-485B-9764-EAC9E56C1D49}" type="datetimeFigureOut">
               <a:rPr lang="en-US" smtClean="0"/>
-              <a:t>11/6/2018</a:t>
+              <a:t>11/12/2018</a:t>
             </a:fld>
             <a:endParaRPr lang="en-US"/>
           </a:p>
@@ -2604,7 +2604,7 @@
           <a:p>
             <a:fld id="{78C97017-6FC3-485B-9764-EAC9E56C1D49}" type="datetimeFigureOut">
               <a:rPr lang="en-US" smtClean="0"/>
-              <a:t>11/6/2018</a:t>
+              <a:t>11/12/2018</a:t>
             </a:fld>
             <a:endParaRPr lang="en-US"/>
           </a:p>
@@ -2856,7 +2856,7 @@
           <a:p>
             <a:fld id="{78C97017-6FC3-485B-9764-EAC9E56C1D49}" type="datetimeFigureOut">
               <a:rPr lang="en-US" smtClean="0"/>
-              <a:t>11/6/2018</a:t>
+              <a:t>11/12/2018</a:t>
             </a:fld>
             <a:endParaRPr lang="en-US"/>
           </a:p>
@@ -3067,7 +3067,7 @@
           <a:p>
             <a:fld id="{78C97017-6FC3-485B-9764-EAC9E56C1D49}" type="datetimeFigureOut">
               <a:rPr lang="en-US" smtClean="0"/>
-              <a:t>11/6/2018</a:t>
+              <a:t>11/12/2018</a:t>
             </a:fld>
             <a:endParaRPr lang="en-US"/>
           </a:p>
@@ -4725,7 +4725,7 @@
         <p:spPr>
           <a:xfrm>
             <a:off x="7419164" y="4440267"/>
-            <a:ext cx="708186" cy="285783"/>
+            <a:ext cx="881018" cy="285783"/>
           </a:xfrm>
           <a:prstGeom prst="rect">
             <a:avLst/>
@@ -4762,7 +4762,7 @@
                   <a:srgbClr val="7030A0"/>
                 </a:solidFill>
               </a:rPr>
-              <a:t>Address</a:t>
+              <a:t>Attendance</a:t>
             </a:r>
             <a:endParaRPr lang="en-SG" sz="1050" dirty="0">
               <a:solidFill>
@@ -4776,6 +4776,7 @@
         <p:nvCxnSpPr>
           <p:cNvPr id="86" name="Elbow Connector 85"/>
           <p:cNvCxnSpPr>
+            <a:cxnSpLocks/>
             <a:stCxn id="78" idx="3"/>
             <a:endCxn id="85" idx="1"/>
           </p:cNvCxnSpPr>
@@ -6804,6 +6805,230 @@
           <a:xfrm rot="16200000" flipV="1">
             <a:off x="4362945" y="1295685"/>
             <a:ext cx="680071" cy="619165"/>
+          </a:xfrm>
+          <a:prstGeom prst="bentConnector3">
+            <a:avLst>
+              <a:gd name="adj1" fmla="val 50000"/>
+            </a:avLst>
+          </a:prstGeom>
+          <a:ln w="19050">
+            <a:solidFill>
+              <a:srgbClr val="7030A0"/>
+            </a:solidFill>
+            <a:headEnd type="none" w="med" len="med"/>
+            <a:tailEnd type="arrow" w="med" len="med"/>
+          </a:ln>
+          <a:effectLst/>
+        </p:spPr>
+        <p:style>
+          <a:lnRef idx="1">
+            <a:schemeClr val="accent2"/>
+          </a:lnRef>
+          <a:fillRef idx="2">
+            <a:schemeClr val="accent2"/>
+          </a:fillRef>
+          <a:effectRef idx="1">
+            <a:schemeClr val="accent2"/>
+          </a:effectRef>
+          <a:fontRef idx="minor">
+            <a:schemeClr val="dk1"/>
+          </a:fontRef>
+        </p:style>
+      </p:cxnSp>
+      <p:sp>
+        <p:nvSpPr>
+          <p:cNvPr id="82" name="Rectangle 8">
+            <a:extLst>
+              <a:ext uri="{FF2B5EF4-FFF2-40B4-BE49-F238E27FC236}">
+                <a16:creationId xmlns:a16="http://schemas.microsoft.com/office/drawing/2014/main" id="{3D8B1FB3-7623-4A2E-870F-450AFA9032D1}"/>
+              </a:ext>
+            </a:extLst>
+          </p:cNvPr>
+          <p:cNvSpPr/>
+          <p:nvPr/>
+        </p:nvSpPr>
+        <p:spPr>
+          <a:xfrm>
+            <a:off x="7419164" y="4756701"/>
+            <a:ext cx="708186" cy="285783"/>
+          </a:xfrm>
+          <a:prstGeom prst="rect">
+            <a:avLst/>
+          </a:prstGeom>
+          <a:ln w="19050">
+            <a:solidFill>
+              <a:srgbClr val="7030A0"/>
+            </a:solidFill>
+          </a:ln>
+          <a:effectLst/>
+        </p:spPr>
+        <p:style>
+          <a:lnRef idx="1">
+            <a:schemeClr val="accent4"/>
+          </a:lnRef>
+          <a:fillRef idx="2">
+            <a:schemeClr val="accent4"/>
+          </a:fillRef>
+          <a:effectRef idx="1">
+            <a:schemeClr val="accent4"/>
+          </a:effectRef>
+          <a:fontRef idx="minor">
+            <a:schemeClr val="dk1"/>
+          </a:fontRef>
+        </p:style>
+        <p:txBody>
+          <a:bodyPr rtlCol="0" anchor="ctr"/>
+          <a:lstStyle/>
+          <a:p>
+            <a:pPr algn="ctr"/>
+            <a:r>
+              <a:rPr lang="en-US" sz="1050" dirty="0">
+                <a:solidFill>
+                  <a:srgbClr val="7030A0"/>
+                </a:solidFill>
+              </a:rPr>
+              <a:t>Payment</a:t>
+            </a:r>
+            <a:endParaRPr lang="en-SG" sz="1050" dirty="0">
+              <a:solidFill>
+                <a:srgbClr val="7030A0"/>
+              </a:solidFill>
+            </a:endParaRPr>
+          </a:p>
+        </p:txBody>
+      </p:sp>
+      <p:sp>
+        <p:nvSpPr>
+          <p:cNvPr id="87" name="Rectangle 8">
+            <a:extLst>
+              <a:ext uri="{FF2B5EF4-FFF2-40B4-BE49-F238E27FC236}">
+                <a16:creationId xmlns:a16="http://schemas.microsoft.com/office/drawing/2014/main" id="{348B0B2F-D58F-4A22-99B7-41EAB8469345}"/>
+              </a:ext>
+            </a:extLst>
+          </p:cNvPr>
+          <p:cNvSpPr/>
+          <p:nvPr/>
+        </p:nvSpPr>
+        <p:spPr>
+          <a:xfrm>
+            <a:off x="7419164" y="5073135"/>
+            <a:ext cx="1039036" cy="285783"/>
+          </a:xfrm>
+          <a:prstGeom prst="rect">
+            <a:avLst/>
+          </a:prstGeom>
+          <a:ln w="19050">
+            <a:solidFill>
+              <a:srgbClr val="7030A0"/>
+            </a:solidFill>
+          </a:ln>
+          <a:effectLst/>
+        </p:spPr>
+        <p:style>
+          <a:lnRef idx="1">
+            <a:schemeClr val="accent4"/>
+          </a:lnRef>
+          <a:fillRef idx="2">
+            <a:schemeClr val="accent4"/>
+          </a:fillRef>
+          <a:effectRef idx="1">
+            <a:schemeClr val="accent4"/>
+          </a:effectRef>
+          <a:fontRef idx="minor">
+            <a:schemeClr val="dk1"/>
+          </a:fontRef>
+        </p:style>
+        <p:txBody>
+          <a:bodyPr rtlCol="0" anchor="ctr"/>
+          <a:lstStyle/>
+          <a:p>
+            <a:pPr algn="ctr"/>
+            <a:r>
+              <a:rPr lang="en-US" sz="1050" dirty="0">
+                <a:solidFill>
+                  <a:srgbClr val="7030A0"/>
+                </a:solidFill>
+              </a:rPr>
+              <a:t>Unique ID (UID)</a:t>
+            </a:r>
+            <a:endParaRPr lang="en-SG" sz="1050" dirty="0">
+              <a:solidFill>
+                <a:srgbClr val="7030A0"/>
+              </a:solidFill>
+            </a:endParaRPr>
+          </a:p>
+        </p:txBody>
+      </p:sp>
+      <p:cxnSp>
+        <p:nvCxnSpPr>
+          <p:cNvPr id="96" name="Elbow Connector 85">
+            <a:extLst>
+              <a:ext uri="{FF2B5EF4-FFF2-40B4-BE49-F238E27FC236}">
+                <a16:creationId xmlns:a16="http://schemas.microsoft.com/office/drawing/2014/main" id="{11D9343C-CA91-47E1-8012-CF374829716D}"/>
+              </a:ext>
+            </a:extLst>
+          </p:cNvPr>
+          <p:cNvCxnSpPr>
+            <a:cxnSpLocks/>
+            <a:stCxn id="78" idx="3"/>
+            <a:endCxn id="87" idx="1"/>
+          </p:cNvCxnSpPr>
+          <p:nvPr/>
+        </p:nvCxnSpPr>
+        <p:spPr>
+          <a:xfrm>
+            <a:off x="6984762" y="3941987"/>
+            <a:ext cx="434402" cy="1274040"/>
+          </a:xfrm>
+          <a:prstGeom prst="bentConnector3">
+            <a:avLst>
+              <a:gd name="adj1" fmla="val 50000"/>
+            </a:avLst>
+          </a:prstGeom>
+          <a:ln w="19050">
+            <a:solidFill>
+              <a:srgbClr val="7030A0"/>
+            </a:solidFill>
+            <a:headEnd type="none" w="med" len="med"/>
+            <a:tailEnd type="arrow" w="med" len="med"/>
+          </a:ln>
+          <a:effectLst/>
+        </p:spPr>
+        <p:style>
+          <a:lnRef idx="1">
+            <a:schemeClr val="accent2"/>
+          </a:lnRef>
+          <a:fillRef idx="2">
+            <a:schemeClr val="accent2"/>
+          </a:fillRef>
+          <a:effectRef idx="1">
+            <a:schemeClr val="accent2"/>
+          </a:effectRef>
+          <a:fontRef idx="minor">
+            <a:schemeClr val="dk1"/>
+          </a:fontRef>
+        </p:style>
+      </p:cxnSp>
+      <p:cxnSp>
+        <p:nvCxnSpPr>
+          <p:cNvPr id="100" name="Elbow Connector 85">
+            <a:extLst>
+              <a:ext uri="{FF2B5EF4-FFF2-40B4-BE49-F238E27FC236}">
+                <a16:creationId xmlns:a16="http://schemas.microsoft.com/office/drawing/2014/main" id="{6B6871DD-6481-48CF-A766-AC029AC840B7}"/>
+              </a:ext>
+            </a:extLst>
+          </p:cNvPr>
+          <p:cNvCxnSpPr>
+            <a:cxnSpLocks/>
+            <a:stCxn id="78" idx="3"/>
+            <a:endCxn id="82" idx="1"/>
+          </p:cNvCxnSpPr>
+          <p:nvPr/>
+        </p:nvCxnSpPr>
+        <p:spPr>
+          <a:xfrm>
+            <a:off x="6984762" y="3941987"/>
+            <a:ext cx="434402" cy="957606"/>
           </a:xfrm>
           <a:prstGeom prst="bentConnector3">
             <a:avLst>

</xml_diff>